<commit_message>
add news about acs prf
</commit_message>
<xml_diff>
--- a/assets/img/image_slider/images.pptx
+++ b/assets/img/image_slider/images.pptx
@@ -6,7 +6,8 @@
   </p:sldMasterIdLst>
   <p:sldIdLst>
     <p:sldId id="256" r:id="rId2"/>
-    <p:sldId id="257" r:id="rId3"/>
+    <p:sldId id="258" r:id="rId3"/>
+    <p:sldId id="257" r:id="rId4"/>
   </p:sldIdLst>
   <p:sldSz cx="12192000" cy="6858000"/>
   <p:notesSz cx="6858000" cy="9144000"/>
@@ -105,6 +106,11 @@
       </a:defRPr>
     </a:lvl9pPr>
   </p:defaultTextStyle>
+  <p:extLst>
+    <p:ext uri="{EFAFB233-063F-42B5-8137-9DF3F51BA10A}">
+      <p15:sldGuideLst xmlns:p15="http://schemas.microsoft.com/office/powerpoint/2012/main"/>
+    </p:ext>
+  </p:extLst>
 </p:presentation>
 </file>
 
@@ -255,7 +261,7 @@
           <a:p>
             <a:fld id="{4A16C27B-D470-42F2-92F9-5356A7F22CB8}" type="datetimeFigureOut">
               <a:rPr lang="en-US" smtClean="0"/>
-              <a:t>10/4/2024</a:t>
+              <a:t>11/2/2024</a:t>
             </a:fld>
             <a:endParaRPr lang="en-US"/>
           </a:p>
@@ -453,7 +459,7 @@
           <a:p>
             <a:fld id="{4A16C27B-D470-42F2-92F9-5356A7F22CB8}" type="datetimeFigureOut">
               <a:rPr lang="en-US" smtClean="0"/>
-              <a:t>10/4/2024</a:t>
+              <a:t>11/2/2024</a:t>
             </a:fld>
             <a:endParaRPr lang="en-US"/>
           </a:p>
@@ -661,7 +667,7 @@
           <a:p>
             <a:fld id="{4A16C27B-D470-42F2-92F9-5356A7F22CB8}" type="datetimeFigureOut">
               <a:rPr lang="en-US" smtClean="0"/>
-              <a:t>10/4/2024</a:t>
+              <a:t>11/2/2024</a:t>
             </a:fld>
             <a:endParaRPr lang="en-US"/>
           </a:p>
@@ -859,7 +865,7 @@
           <a:p>
             <a:fld id="{4A16C27B-D470-42F2-92F9-5356A7F22CB8}" type="datetimeFigureOut">
               <a:rPr lang="en-US" smtClean="0"/>
-              <a:t>10/4/2024</a:t>
+              <a:t>11/2/2024</a:t>
             </a:fld>
             <a:endParaRPr lang="en-US"/>
           </a:p>
@@ -1134,7 +1140,7 @@
           <a:p>
             <a:fld id="{4A16C27B-D470-42F2-92F9-5356A7F22CB8}" type="datetimeFigureOut">
               <a:rPr lang="en-US" smtClean="0"/>
-              <a:t>10/4/2024</a:t>
+              <a:t>11/2/2024</a:t>
             </a:fld>
             <a:endParaRPr lang="en-US"/>
           </a:p>
@@ -1399,7 +1405,7 @@
           <a:p>
             <a:fld id="{4A16C27B-D470-42F2-92F9-5356A7F22CB8}" type="datetimeFigureOut">
               <a:rPr lang="en-US" smtClean="0"/>
-              <a:t>10/4/2024</a:t>
+              <a:t>11/2/2024</a:t>
             </a:fld>
             <a:endParaRPr lang="en-US"/>
           </a:p>
@@ -1811,7 +1817,7 @@
           <a:p>
             <a:fld id="{4A16C27B-D470-42F2-92F9-5356A7F22CB8}" type="datetimeFigureOut">
               <a:rPr lang="en-US" smtClean="0"/>
-              <a:t>10/4/2024</a:t>
+              <a:t>11/2/2024</a:t>
             </a:fld>
             <a:endParaRPr lang="en-US"/>
           </a:p>
@@ -1952,7 +1958,7 @@
           <a:p>
             <a:fld id="{4A16C27B-D470-42F2-92F9-5356A7F22CB8}" type="datetimeFigureOut">
               <a:rPr lang="en-US" smtClean="0"/>
-              <a:t>10/4/2024</a:t>
+              <a:t>11/2/2024</a:t>
             </a:fld>
             <a:endParaRPr lang="en-US"/>
           </a:p>
@@ -2065,7 +2071,7 @@
           <a:p>
             <a:fld id="{4A16C27B-D470-42F2-92F9-5356A7F22CB8}" type="datetimeFigureOut">
               <a:rPr lang="en-US" smtClean="0"/>
-              <a:t>10/4/2024</a:t>
+              <a:t>11/2/2024</a:t>
             </a:fld>
             <a:endParaRPr lang="en-US"/>
           </a:p>
@@ -2376,7 +2382,7 @@
           <a:p>
             <a:fld id="{4A16C27B-D470-42F2-92F9-5356A7F22CB8}" type="datetimeFigureOut">
               <a:rPr lang="en-US" smtClean="0"/>
-              <a:t>10/4/2024</a:t>
+              <a:t>11/2/2024</a:t>
             </a:fld>
             <a:endParaRPr lang="en-US"/>
           </a:p>
@@ -2664,7 +2670,7 @@
           <a:p>
             <a:fld id="{4A16C27B-D470-42F2-92F9-5356A7F22CB8}" type="datetimeFigureOut">
               <a:rPr lang="en-US" smtClean="0"/>
-              <a:t>10/4/2024</a:t>
+              <a:t>11/2/2024</a:t>
             </a:fld>
             <a:endParaRPr lang="en-US"/>
           </a:p>
@@ -2905,7 +2911,7 @@
           <a:p>
             <a:fld id="{4A16C27B-D470-42F2-92F9-5356A7F22CB8}" type="datetimeFigureOut">
               <a:rPr lang="en-US" smtClean="0"/>
-              <a:t>10/4/2024</a:t>
+              <a:t>11/2/2024</a:t>
             </a:fld>
             <a:endParaRPr lang="en-US"/>
           </a:p>
@@ -3465,6 +3471,176 @@
 </file>
 
 <file path=ppt/slides/slide2.xml><?xml version="1.0" encoding="utf-8"?>
+<p:sld xmlns:a="http://schemas.openxmlformats.org/drawingml/2006/main" xmlns:r="http://schemas.openxmlformats.org/officeDocument/2006/relationships" xmlns:p="http://schemas.openxmlformats.org/presentationml/2006/main">
+  <p:cSld>
+    <p:spTree>
+      <p:nvGrpSpPr>
+        <p:cNvPr id="1" name="">
+          <a:extLst>
+            <a:ext uri="{FF2B5EF4-FFF2-40B4-BE49-F238E27FC236}">
+              <a16:creationId xmlns:a16="http://schemas.microsoft.com/office/drawing/2014/main" id="{64A8C2D0-7C4B-1642-3AC9-3C90C1F01262}"/>
+            </a:ext>
+          </a:extLst>
+        </p:cNvPr>
+        <p:cNvGrpSpPr/>
+        <p:nvPr/>
+      </p:nvGrpSpPr>
+      <p:grpSpPr>
+        <a:xfrm>
+          <a:off x="0" y="0"/>
+          <a:ext cx="0" cy="0"/>
+          <a:chOff x="0" y="0"/>
+          <a:chExt cx="0" cy="0"/>
+        </a:xfrm>
+      </p:grpSpPr>
+      <p:sp>
+        <p:nvSpPr>
+          <p:cNvPr id="6" name="Rectangle 5">
+            <a:extLst>
+              <a:ext uri="{FF2B5EF4-FFF2-40B4-BE49-F238E27FC236}">
+                <a16:creationId xmlns:a16="http://schemas.microsoft.com/office/drawing/2014/main" id="{5570B1E2-72AE-3259-19AD-0447A0A34F1A}"/>
+              </a:ext>
+            </a:extLst>
+          </p:cNvPr>
+          <p:cNvSpPr/>
+          <p:nvPr/>
+        </p:nvSpPr>
+        <p:spPr>
+          <a:xfrm>
+            <a:off x="0" y="4632960"/>
+            <a:ext cx="12191999" cy="1465312"/>
+          </a:xfrm>
+          <a:prstGeom prst="rect">
+            <a:avLst/>
+          </a:prstGeom>
+          <a:solidFill>
+            <a:srgbClr val="000000">
+              <a:alpha val="60000"/>
+            </a:srgbClr>
+          </a:solidFill>
+          <a:ln>
+            <a:noFill/>
+          </a:ln>
+        </p:spPr>
+        <p:style>
+          <a:lnRef idx="2">
+            <a:schemeClr val="accent1">
+              <a:shade val="15000"/>
+            </a:schemeClr>
+          </a:lnRef>
+          <a:fillRef idx="1">
+            <a:schemeClr val="accent1"/>
+          </a:fillRef>
+          <a:effectRef idx="0">
+            <a:schemeClr val="accent1"/>
+          </a:effectRef>
+          <a:fontRef idx="minor">
+            <a:schemeClr val="lt1"/>
+          </a:fontRef>
+        </p:style>
+        <p:txBody>
+          <a:bodyPr rtlCol="0" anchor="ctr"/>
+          <a:lstStyle/>
+          <a:p>
+            <a:pPr marL="457200"/>
+            <a:endParaRPr lang="en-US" sz="2400" dirty="0"/>
+          </a:p>
+        </p:txBody>
+      </p:sp>
+      <p:sp>
+        <p:nvSpPr>
+          <p:cNvPr id="7" name="TextBox 6">
+            <a:extLst>
+              <a:ext uri="{FF2B5EF4-FFF2-40B4-BE49-F238E27FC236}">
+                <a16:creationId xmlns:a16="http://schemas.microsoft.com/office/drawing/2014/main" id="{777697FB-0660-BB4F-15B8-CB3738B14232}"/>
+              </a:ext>
+            </a:extLst>
+          </p:cNvPr>
+          <p:cNvSpPr txBox="1"/>
+          <p:nvPr/>
+        </p:nvSpPr>
+        <p:spPr>
+          <a:xfrm>
+            <a:off x="586448" y="4950117"/>
+            <a:ext cx="11019099" cy="830997"/>
+          </a:xfrm>
+          <a:prstGeom prst="rect">
+            <a:avLst/>
+          </a:prstGeom>
+          <a:noFill/>
+        </p:spPr>
+        <p:txBody>
+          <a:bodyPr wrap="square" rtlCol="0">
+            <a:spAutoFit/>
+          </a:bodyPr>
+          <a:lstStyle/>
+          <a:p>
+            <a:r>
+              <a:rPr lang="en-US" sz="2400" dirty="0">
+                <a:solidFill>
+                  <a:schemeClr val="bg1"/>
+                </a:solidFill>
+              </a:rPr>
+              <a:t>Prof. Shi has won the American Chemical Society Petroleum Research Fund Doctoral New Investigator award! </a:t>
+            </a:r>
+          </a:p>
+        </p:txBody>
+      </p:sp>
+      <p:pic>
+        <p:nvPicPr>
+          <p:cNvPr id="4" name="Picture 3">
+            <a:extLst>
+              <a:ext uri="{FF2B5EF4-FFF2-40B4-BE49-F238E27FC236}">
+                <a16:creationId xmlns:a16="http://schemas.microsoft.com/office/drawing/2014/main" id="{29959A76-B4CF-8D16-7AAD-CC6EEB28E8D8}"/>
+              </a:ext>
+            </a:extLst>
+          </p:cNvPr>
+          <p:cNvPicPr>
+            <a:picLocks noChangeAspect="1"/>
+          </p:cNvPicPr>
+          <p:nvPr/>
+        </p:nvPicPr>
+        <p:blipFill>
+          <a:blip r:embed="rId2">
+            <a:clrChange>
+              <a:clrFrom>
+                <a:srgbClr val="CFECFF"/>
+              </a:clrFrom>
+              <a:clrTo>
+                <a:srgbClr val="CFECFF">
+                  <a:alpha val="0"/>
+                </a:srgbClr>
+              </a:clrTo>
+            </a:clrChange>
+          </a:blip>
+          <a:stretch>
+            <a:fillRect/>
+          </a:stretch>
+        </p:blipFill>
+        <p:spPr>
+          <a:xfrm>
+            <a:off x="1968497" y="15662"/>
+            <a:ext cx="8255000" cy="4617297"/>
+          </a:xfrm>
+          <a:prstGeom prst="rect">
+            <a:avLst/>
+          </a:prstGeom>
+        </p:spPr>
+      </p:pic>
+    </p:spTree>
+    <p:extLst>
+      <p:ext uri="{BB962C8B-B14F-4D97-AF65-F5344CB8AC3E}">
+        <p14:creationId xmlns:p14="http://schemas.microsoft.com/office/powerpoint/2010/main" val="2096433516"/>
+      </p:ext>
+    </p:extLst>
+  </p:cSld>
+  <p:clrMapOvr>
+    <a:masterClrMapping/>
+  </p:clrMapOvr>
+</p:sld>
+</file>
+
+<file path=ppt/slides/slide3.xml><?xml version="1.0" encoding="utf-8"?>
 <p:sld xmlns:a="http://schemas.openxmlformats.org/drawingml/2006/main" xmlns:r="http://schemas.openxmlformats.org/officeDocument/2006/relationships" xmlns:p="http://schemas.openxmlformats.org/presentationml/2006/main">
   <p:cSld>
     <p:spTree>

</xml_diff>

<commit_message>
Deploying to gh-pages from @ ShiResearchGroup/shiresearchgroup.github.io@44cdd1a17180d38bfdc4479f390a0296dfe67baf 🚀
</commit_message>
<xml_diff>
--- a/assets/img/image_slider/images.pptx
+++ b/assets/img/image_slider/images.pptx
@@ -6,7 +6,8 @@
   </p:sldMasterIdLst>
   <p:sldIdLst>
     <p:sldId id="256" r:id="rId2"/>
-    <p:sldId id="257" r:id="rId3"/>
+    <p:sldId id="258" r:id="rId3"/>
+    <p:sldId id="257" r:id="rId4"/>
   </p:sldIdLst>
   <p:sldSz cx="12192000" cy="6858000"/>
   <p:notesSz cx="6858000" cy="9144000"/>
@@ -105,6 +106,11 @@
       </a:defRPr>
     </a:lvl9pPr>
   </p:defaultTextStyle>
+  <p:extLst>
+    <p:ext uri="{EFAFB233-063F-42B5-8137-9DF3F51BA10A}">
+      <p15:sldGuideLst xmlns:p15="http://schemas.microsoft.com/office/powerpoint/2012/main"/>
+    </p:ext>
+  </p:extLst>
 </p:presentation>
 </file>
 
@@ -255,7 +261,7 @@
           <a:p>
             <a:fld id="{4A16C27B-D470-42F2-92F9-5356A7F22CB8}" type="datetimeFigureOut">
               <a:rPr lang="en-US" smtClean="0"/>
-              <a:t>10/4/2024</a:t>
+              <a:t>11/2/2024</a:t>
             </a:fld>
             <a:endParaRPr lang="en-US"/>
           </a:p>
@@ -453,7 +459,7 @@
           <a:p>
             <a:fld id="{4A16C27B-D470-42F2-92F9-5356A7F22CB8}" type="datetimeFigureOut">
               <a:rPr lang="en-US" smtClean="0"/>
-              <a:t>10/4/2024</a:t>
+              <a:t>11/2/2024</a:t>
             </a:fld>
             <a:endParaRPr lang="en-US"/>
           </a:p>
@@ -661,7 +667,7 @@
           <a:p>
             <a:fld id="{4A16C27B-D470-42F2-92F9-5356A7F22CB8}" type="datetimeFigureOut">
               <a:rPr lang="en-US" smtClean="0"/>
-              <a:t>10/4/2024</a:t>
+              <a:t>11/2/2024</a:t>
             </a:fld>
             <a:endParaRPr lang="en-US"/>
           </a:p>
@@ -859,7 +865,7 @@
           <a:p>
             <a:fld id="{4A16C27B-D470-42F2-92F9-5356A7F22CB8}" type="datetimeFigureOut">
               <a:rPr lang="en-US" smtClean="0"/>
-              <a:t>10/4/2024</a:t>
+              <a:t>11/2/2024</a:t>
             </a:fld>
             <a:endParaRPr lang="en-US"/>
           </a:p>
@@ -1134,7 +1140,7 @@
           <a:p>
             <a:fld id="{4A16C27B-D470-42F2-92F9-5356A7F22CB8}" type="datetimeFigureOut">
               <a:rPr lang="en-US" smtClean="0"/>
-              <a:t>10/4/2024</a:t>
+              <a:t>11/2/2024</a:t>
             </a:fld>
             <a:endParaRPr lang="en-US"/>
           </a:p>
@@ -1399,7 +1405,7 @@
           <a:p>
             <a:fld id="{4A16C27B-D470-42F2-92F9-5356A7F22CB8}" type="datetimeFigureOut">
               <a:rPr lang="en-US" smtClean="0"/>
-              <a:t>10/4/2024</a:t>
+              <a:t>11/2/2024</a:t>
             </a:fld>
             <a:endParaRPr lang="en-US"/>
           </a:p>
@@ -1811,7 +1817,7 @@
           <a:p>
             <a:fld id="{4A16C27B-D470-42F2-92F9-5356A7F22CB8}" type="datetimeFigureOut">
               <a:rPr lang="en-US" smtClean="0"/>
-              <a:t>10/4/2024</a:t>
+              <a:t>11/2/2024</a:t>
             </a:fld>
             <a:endParaRPr lang="en-US"/>
           </a:p>
@@ -1952,7 +1958,7 @@
           <a:p>
             <a:fld id="{4A16C27B-D470-42F2-92F9-5356A7F22CB8}" type="datetimeFigureOut">
               <a:rPr lang="en-US" smtClean="0"/>
-              <a:t>10/4/2024</a:t>
+              <a:t>11/2/2024</a:t>
             </a:fld>
             <a:endParaRPr lang="en-US"/>
           </a:p>
@@ -2065,7 +2071,7 @@
           <a:p>
             <a:fld id="{4A16C27B-D470-42F2-92F9-5356A7F22CB8}" type="datetimeFigureOut">
               <a:rPr lang="en-US" smtClean="0"/>
-              <a:t>10/4/2024</a:t>
+              <a:t>11/2/2024</a:t>
             </a:fld>
             <a:endParaRPr lang="en-US"/>
           </a:p>
@@ -2376,7 +2382,7 @@
           <a:p>
             <a:fld id="{4A16C27B-D470-42F2-92F9-5356A7F22CB8}" type="datetimeFigureOut">
               <a:rPr lang="en-US" smtClean="0"/>
-              <a:t>10/4/2024</a:t>
+              <a:t>11/2/2024</a:t>
             </a:fld>
             <a:endParaRPr lang="en-US"/>
           </a:p>
@@ -2664,7 +2670,7 @@
           <a:p>
             <a:fld id="{4A16C27B-D470-42F2-92F9-5356A7F22CB8}" type="datetimeFigureOut">
               <a:rPr lang="en-US" smtClean="0"/>
-              <a:t>10/4/2024</a:t>
+              <a:t>11/2/2024</a:t>
             </a:fld>
             <a:endParaRPr lang="en-US"/>
           </a:p>
@@ -2905,7 +2911,7 @@
           <a:p>
             <a:fld id="{4A16C27B-D470-42F2-92F9-5356A7F22CB8}" type="datetimeFigureOut">
               <a:rPr lang="en-US" smtClean="0"/>
-              <a:t>10/4/2024</a:t>
+              <a:t>11/2/2024</a:t>
             </a:fld>
             <a:endParaRPr lang="en-US"/>
           </a:p>
@@ -3465,6 +3471,176 @@
 </file>
 
 <file path=ppt/slides/slide2.xml><?xml version="1.0" encoding="utf-8"?>
+<p:sld xmlns:a="http://schemas.openxmlformats.org/drawingml/2006/main" xmlns:r="http://schemas.openxmlformats.org/officeDocument/2006/relationships" xmlns:p="http://schemas.openxmlformats.org/presentationml/2006/main">
+  <p:cSld>
+    <p:spTree>
+      <p:nvGrpSpPr>
+        <p:cNvPr id="1" name="">
+          <a:extLst>
+            <a:ext uri="{FF2B5EF4-FFF2-40B4-BE49-F238E27FC236}">
+              <a16:creationId xmlns:a16="http://schemas.microsoft.com/office/drawing/2014/main" id="{64A8C2D0-7C4B-1642-3AC9-3C90C1F01262}"/>
+            </a:ext>
+          </a:extLst>
+        </p:cNvPr>
+        <p:cNvGrpSpPr/>
+        <p:nvPr/>
+      </p:nvGrpSpPr>
+      <p:grpSpPr>
+        <a:xfrm>
+          <a:off x="0" y="0"/>
+          <a:ext cx="0" cy="0"/>
+          <a:chOff x="0" y="0"/>
+          <a:chExt cx="0" cy="0"/>
+        </a:xfrm>
+      </p:grpSpPr>
+      <p:sp>
+        <p:nvSpPr>
+          <p:cNvPr id="6" name="Rectangle 5">
+            <a:extLst>
+              <a:ext uri="{FF2B5EF4-FFF2-40B4-BE49-F238E27FC236}">
+                <a16:creationId xmlns:a16="http://schemas.microsoft.com/office/drawing/2014/main" id="{5570B1E2-72AE-3259-19AD-0447A0A34F1A}"/>
+              </a:ext>
+            </a:extLst>
+          </p:cNvPr>
+          <p:cNvSpPr/>
+          <p:nvPr/>
+        </p:nvSpPr>
+        <p:spPr>
+          <a:xfrm>
+            <a:off x="0" y="4632960"/>
+            <a:ext cx="12191999" cy="1465312"/>
+          </a:xfrm>
+          <a:prstGeom prst="rect">
+            <a:avLst/>
+          </a:prstGeom>
+          <a:solidFill>
+            <a:srgbClr val="000000">
+              <a:alpha val="60000"/>
+            </a:srgbClr>
+          </a:solidFill>
+          <a:ln>
+            <a:noFill/>
+          </a:ln>
+        </p:spPr>
+        <p:style>
+          <a:lnRef idx="2">
+            <a:schemeClr val="accent1">
+              <a:shade val="15000"/>
+            </a:schemeClr>
+          </a:lnRef>
+          <a:fillRef idx="1">
+            <a:schemeClr val="accent1"/>
+          </a:fillRef>
+          <a:effectRef idx="0">
+            <a:schemeClr val="accent1"/>
+          </a:effectRef>
+          <a:fontRef idx="minor">
+            <a:schemeClr val="lt1"/>
+          </a:fontRef>
+        </p:style>
+        <p:txBody>
+          <a:bodyPr rtlCol="0" anchor="ctr"/>
+          <a:lstStyle/>
+          <a:p>
+            <a:pPr marL="457200"/>
+            <a:endParaRPr lang="en-US" sz="2400" dirty="0"/>
+          </a:p>
+        </p:txBody>
+      </p:sp>
+      <p:sp>
+        <p:nvSpPr>
+          <p:cNvPr id="7" name="TextBox 6">
+            <a:extLst>
+              <a:ext uri="{FF2B5EF4-FFF2-40B4-BE49-F238E27FC236}">
+                <a16:creationId xmlns:a16="http://schemas.microsoft.com/office/drawing/2014/main" id="{777697FB-0660-BB4F-15B8-CB3738B14232}"/>
+              </a:ext>
+            </a:extLst>
+          </p:cNvPr>
+          <p:cNvSpPr txBox="1"/>
+          <p:nvPr/>
+        </p:nvSpPr>
+        <p:spPr>
+          <a:xfrm>
+            <a:off x="586448" y="4950117"/>
+            <a:ext cx="11019099" cy="830997"/>
+          </a:xfrm>
+          <a:prstGeom prst="rect">
+            <a:avLst/>
+          </a:prstGeom>
+          <a:noFill/>
+        </p:spPr>
+        <p:txBody>
+          <a:bodyPr wrap="square" rtlCol="0">
+            <a:spAutoFit/>
+          </a:bodyPr>
+          <a:lstStyle/>
+          <a:p>
+            <a:r>
+              <a:rPr lang="en-US" sz="2400" dirty="0">
+                <a:solidFill>
+                  <a:schemeClr val="bg1"/>
+                </a:solidFill>
+              </a:rPr>
+              <a:t>Prof. Shi has won the American Chemical Society Petroleum Research Fund Doctoral New Investigator award! </a:t>
+            </a:r>
+          </a:p>
+        </p:txBody>
+      </p:sp>
+      <p:pic>
+        <p:nvPicPr>
+          <p:cNvPr id="4" name="Picture 3">
+            <a:extLst>
+              <a:ext uri="{FF2B5EF4-FFF2-40B4-BE49-F238E27FC236}">
+                <a16:creationId xmlns:a16="http://schemas.microsoft.com/office/drawing/2014/main" id="{29959A76-B4CF-8D16-7AAD-CC6EEB28E8D8}"/>
+              </a:ext>
+            </a:extLst>
+          </p:cNvPr>
+          <p:cNvPicPr>
+            <a:picLocks noChangeAspect="1"/>
+          </p:cNvPicPr>
+          <p:nvPr/>
+        </p:nvPicPr>
+        <p:blipFill>
+          <a:blip r:embed="rId2">
+            <a:clrChange>
+              <a:clrFrom>
+                <a:srgbClr val="CFECFF"/>
+              </a:clrFrom>
+              <a:clrTo>
+                <a:srgbClr val="CFECFF">
+                  <a:alpha val="0"/>
+                </a:srgbClr>
+              </a:clrTo>
+            </a:clrChange>
+          </a:blip>
+          <a:stretch>
+            <a:fillRect/>
+          </a:stretch>
+        </p:blipFill>
+        <p:spPr>
+          <a:xfrm>
+            <a:off x="1968497" y="15662"/>
+            <a:ext cx="8255000" cy="4617297"/>
+          </a:xfrm>
+          <a:prstGeom prst="rect">
+            <a:avLst/>
+          </a:prstGeom>
+        </p:spPr>
+      </p:pic>
+    </p:spTree>
+    <p:extLst>
+      <p:ext uri="{BB962C8B-B14F-4D97-AF65-F5344CB8AC3E}">
+        <p14:creationId xmlns:p14="http://schemas.microsoft.com/office/powerpoint/2010/main" val="2096433516"/>
+      </p:ext>
+    </p:extLst>
+  </p:cSld>
+  <p:clrMapOvr>
+    <a:masterClrMapping/>
+  </p:clrMapOvr>
+</p:sld>
+</file>
+
+<file path=ppt/slides/slide3.xml><?xml version="1.0" encoding="utf-8"?>
 <p:sld xmlns:a="http://schemas.openxmlformats.org/drawingml/2006/main" xmlns:r="http://schemas.openxmlformats.org/officeDocument/2006/relationships" xmlns:p="http://schemas.openxmlformats.org/presentationml/2006/main">
   <p:cSld>
     <p:spTree>

</xml_diff>

<commit_message>
Deploying to gh-pages from @ ShiResearchGroup/shiresearchgroup.github.io@bcdb8b1e2b494bbc828e6b8b2e623fa81cc86620 🚀
</commit_message>
<xml_diff>
--- a/assets/img/image_slider/images.pptx
+++ b/assets/img/image_slider/images.pptx
@@ -7,7 +7,8 @@
   <p:sldIdLst>
     <p:sldId id="256" r:id="rId2"/>
     <p:sldId id="258" r:id="rId3"/>
-    <p:sldId id="257" r:id="rId4"/>
+    <p:sldId id="259" r:id="rId4"/>
+    <p:sldId id="257" r:id="rId5"/>
   </p:sldIdLst>
   <p:sldSz cx="12192000" cy="6858000"/>
   <p:notesSz cx="6858000" cy="9144000"/>
@@ -261,7 +262,7 @@
           <a:p>
             <a:fld id="{4A16C27B-D470-42F2-92F9-5356A7F22CB8}" type="datetimeFigureOut">
               <a:rPr lang="en-US" smtClean="0"/>
-              <a:t>11/2/2024</a:t>
+              <a:t>11/19/2024</a:t>
             </a:fld>
             <a:endParaRPr lang="en-US"/>
           </a:p>
@@ -459,7 +460,7 @@
           <a:p>
             <a:fld id="{4A16C27B-D470-42F2-92F9-5356A7F22CB8}" type="datetimeFigureOut">
               <a:rPr lang="en-US" smtClean="0"/>
-              <a:t>11/2/2024</a:t>
+              <a:t>11/19/2024</a:t>
             </a:fld>
             <a:endParaRPr lang="en-US"/>
           </a:p>
@@ -667,7 +668,7 @@
           <a:p>
             <a:fld id="{4A16C27B-D470-42F2-92F9-5356A7F22CB8}" type="datetimeFigureOut">
               <a:rPr lang="en-US" smtClean="0"/>
-              <a:t>11/2/2024</a:t>
+              <a:t>11/19/2024</a:t>
             </a:fld>
             <a:endParaRPr lang="en-US"/>
           </a:p>
@@ -865,7 +866,7 @@
           <a:p>
             <a:fld id="{4A16C27B-D470-42F2-92F9-5356A7F22CB8}" type="datetimeFigureOut">
               <a:rPr lang="en-US" smtClean="0"/>
-              <a:t>11/2/2024</a:t>
+              <a:t>11/19/2024</a:t>
             </a:fld>
             <a:endParaRPr lang="en-US"/>
           </a:p>
@@ -1140,7 +1141,7 @@
           <a:p>
             <a:fld id="{4A16C27B-D470-42F2-92F9-5356A7F22CB8}" type="datetimeFigureOut">
               <a:rPr lang="en-US" smtClean="0"/>
-              <a:t>11/2/2024</a:t>
+              <a:t>11/19/2024</a:t>
             </a:fld>
             <a:endParaRPr lang="en-US"/>
           </a:p>
@@ -1405,7 +1406,7 @@
           <a:p>
             <a:fld id="{4A16C27B-D470-42F2-92F9-5356A7F22CB8}" type="datetimeFigureOut">
               <a:rPr lang="en-US" smtClean="0"/>
-              <a:t>11/2/2024</a:t>
+              <a:t>11/19/2024</a:t>
             </a:fld>
             <a:endParaRPr lang="en-US"/>
           </a:p>
@@ -1817,7 +1818,7 @@
           <a:p>
             <a:fld id="{4A16C27B-D470-42F2-92F9-5356A7F22CB8}" type="datetimeFigureOut">
               <a:rPr lang="en-US" smtClean="0"/>
-              <a:t>11/2/2024</a:t>
+              <a:t>11/19/2024</a:t>
             </a:fld>
             <a:endParaRPr lang="en-US"/>
           </a:p>
@@ -1958,7 +1959,7 @@
           <a:p>
             <a:fld id="{4A16C27B-D470-42F2-92F9-5356A7F22CB8}" type="datetimeFigureOut">
               <a:rPr lang="en-US" smtClean="0"/>
-              <a:t>11/2/2024</a:t>
+              <a:t>11/19/2024</a:t>
             </a:fld>
             <a:endParaRPr lang="en-US"/>
           </a:p>
@@ -2071,7 +2072,7 @@
           <a:p>
             <a:fld id="{4A16C27B-D470-42F2-92F9-5356A7F22CB8}" type="datetimeFigureOut">
               <a:rPr lang="en-US" smtClean="0"/>
-              <a:t>11/2/2024</a:t>
+              <a:t>11/19/2024</a:t>
             </a:fld>
             <a:endParaRPr lang="en-US"/>
           </a:p>
@@ -2382,7 +2383,7 @@
           <a:p>
             <a:fld id="{4A16C27B-D470-42F2-92F9-5356A7F22CB8}" type="datetimeFigureOut">
               <a:rPr lang="en-US" smtClean="0"/>
-              <a:t>11/2/2024</a:t>
+              <a:t>11/19/2024</a:t>
             </a:fld>
             <a:endParaRPr lang="en-US"/>
           </a:p>
@@ -2670,7 +2671,7 @@
           <a:p>
             <a:fld id="{4A16C27B-D470-42F2-92F9-5356A7F22CB8}" type="datetimeFigureOut">
               <a:rPr lang="en-US" smtClean="0"/>
-              <a:t>11/2/2024</a:t>
+              <a:t>11/19/2024</a:t>
             </a:fld>
             <a:endParaRPr lang="en-US"/>
           </a:p>
@@ -2911,7 +2912,7 @@
           <a:p>
             <a:fld id="{4A16C27B-D470-42F2-92F9-5356A7F22CB8}" type="datetimeFigureOut">
               <a:rPr lang="en-US" smtClean="0"/>
-              <a:t>11/2/2024</a:t>
+              <a:t>11/19/2024</a:t>
             </a:fld>
             <a:endParaRPr lang="en-US"/>
           </a:p>
@@ -3641,6 +3642,238 @@
 </file>
 
 <file path=ppt/slides/slide3.xml><?xml version="1.0" encoding="utf-8"?>
+<p:sld xmlns:a="http://schemas.openxmlformats.org/drawingml/2006/main" xmlns:r="http://schemas.openxmlformats.org/officeDocument/2006/relationships" xmlns:p="http://schemas.openxmlformats.org/presentationml/2006/main">
+  <p:cSld>
+    <p:spTree>
+      <p:nvGrpSpPr>
+        <p:cNvPr id="1" name="">
+          <a:extLst>
+            <a:ext uri="{FF2B5EF4-FFF2-40B4-BE49-F238E27FC236}">
+              <a16:creationId xmlns:a16="http://schemas.microsoft.com/office/drawing/2014/main" id="{6EC0CCC2-30B1-7969-A32A-39FF3F58977F}"/>
+            </a:ext>
+          </a:extLst>
+        </p:cNvPr>
+        <p:cNvGrpSpPr/>
+        <p:nvPr/>
+      </p:nvGrpSpPr>
+      <p:grpSpPr>
+        <a:xfrm>
+          <a:off x="0" y="0"/>
+          <a:ext cx="0" cy="0"/>
+          <a:chOff x="0" y="0"/>
+          <a:chExt cx="0" cy="0"/>
+        </a:xfrm>
+      </p:grpSpPr>
+      <p:pic>
+        <p:nvPicPr>
+          <p:cNvPr id="1026" name="Picture 2">
+            <a:extLst>
+              <a:ext uri="{FF2B5EF4-FFF2-40B4-BE49-F238E27FC236}">
+                <a16:creationId xmlns:a16="http://schemas.microsoft.com/office/drawing/2014/main" id="{C7AAF080-0055-A307-EF5D-DE8DB6213B70}"/>
+              </a:ext>
+            </a:extLst>
+          </p:cNvPr>
+          <p:cNvPicPr>
+            <a:picLocks noChangeAspect="1" noChangeArrowheads="1"/>
+          </p:cNvPicPr>
+          <p:nvPr/>
+        </p:nvPicPr>
+        <p:blipFill>
+          <a:blip r:embed="rId2">
+            <a:extLst>
+              <a:ext uri="{28A0092B-C50C-407E-A947-70E740481C1C}">
+                <a14:useLocalDpi xmlns:a14="http://schemas.microsoft.com/office/drawing/2010/main" val="0"/>
+              </a:ext>
+            </a:extLst>
+          </a:blip>
+          <a:srcRect/>
+          <a:stretch>
+            <a:fillRect/>
+          </a:stretch>
+        </p:blipFill>
+        <p:spPr bwMode="auto">
+          <a:xfrm>
+            <a:off x="8822394" y="946102"/>
+            <a:ext cx="2931671" cy="3057707"/>
+          </a:xfrm>
+          <a:prstGeom prst="rect">
+            <a:avLst/>
+          </a:prstGeom>
+          <a:noFill/>
+          <a:extLst>
+            <a:ext uri="{909E8E84-426E-40DD-AFC4-6F175D3DCCD1}">
+              <a14:hiddenFill xmlns:a14="http://schemas.microsoft.com/office/drawing/2010/main">
+                <a:solidFill>
+                  <a:srgbClr val="FFFFFF"/>
+                </a:solidFill>
+              </a14:hiddenFill>
+            </a:ext>
+          </a:extLst>
+        </p:spPr>
+      </p:pic>
+      <p:pic>
+        <p:nvPicPr>
+          <p:cNvPr id="3" name="Picture 2">
+            <a:extLst>
+              <a:ext uri="{FF2B5EF4-FFF2-40B4-BE49-F238E27FC236}">
+                <a16:creationId xmlns:a16="http://schemas.microsoft.com/office/drawing/2014/main" id="{F9975D59-C4C6-ABC6-E061-A41E625D4EDB}"/>
+              </a:ext>
+            </a:extLst>
+          </p:cNvPr>
+          <p:cNvPicPr>
+            <a:picLocks noChangeAspect="1"/>
+          </p:cNvPicPr>
+          <p:nvPr/>
+        </p:nvPicPr>
+        <p:blipFill>
+          <a:blip r:embed="rId3">
+            <a:clrChange>
+              <a:clrFrom>
+                <a:srgbClr val="FFFFFF"/>
+              </a:clrFrom>
+              <a:clrTo>
+                <a:srgbClr val="FFFFFF">
+                  <a:alpha val="0"/>
+                </a:srgbClr>
+              </a:clrTo>
+            </a:clrChange>
+          </a:blip>
+          <a:srcRect r="974"/>
+          <a:stretch/>
+        </p:blipFill>
+        <p:spPr>
+          <a:xfrm>
+            <a:off x="286506" y="860803"/>
+            <a:ext cx="8187712" cy="3143006"/>
+          </a:xfrm>
+          <a:prstGeom prst="rect">
+            <a:avLst/>
+          </a:prstGeom>
+        </p:spPr>
+      </p:pic>
+      <p:sp>
+        <p:nvSpPr>
+          <p:cNvPr id="6" name="Rectangle 5">
+            <a:extLst>
+              <a:ext uri="{FF2B5EF4-FFF2-40B4-BE49-F238E27FC236}">
+                <a16:creationId xmlns:a16="http://schemas.microsoft.com/office/drawing/2014/main" id="{94E3BC9B-9334-D067-1BE4-B147B4490666}"/>
+              </a:ext>
+            </a:extLst>
+          </p:cNvPr>
+          <p:cNvSpPr/>
+          <p:nvPr/>
+        </p:nvSpPr>
+        <p:spPr>
+          <a:xfrm>
+            <a:off x="0" y="4632960"/>
+            <a:ext cx="12191999" cy="1465312"/>
+          </a:xfrm>
+          <a:prstGeom prst="rect">
+            <a:avLst/>
+          </a:prstGeom>
+          <a:solidFill>
+            <a:srgbClr val="000000">
+              <a:alpha val="60000"/>
+            </a:srgbClr>
+          </a:solidFill>
+          <a:ln>
+            <a:noFill/>
+          </a:ln>
+        </p:spPr>
+        <p:style>
+          <a:lnRef idx="2">
+            <a:schemeClr val="accent1">
+              <a:shade val="15000"/>
+            </a:schemeClr>
+          </a:lnRef>
+          <a:fillRef idx="1">
+            <a:schemeClr val="accent1"/>
+          </a:fillRef>
+          <a:effectRef idx="0">
+            <a:schemeClr val="accent1"/>
+          </a:effectRef>
+          <a:fontRef idx="minor">
+            <a:schemeClr val="lt1"/>
+          </a:fontRef>
+        </p:style>
+        <p:txBody>
+          <a:bodyPr rtlCol="0" anchor="ctr"/>
+          <a:lstStyle/>
+          <a:p>
+            <a:pPr marL="457200"/>
+            <a:endParaRPr lang="en-US" sz="2400" dirty="0"/>
+          </a:p>
+        </p:txBody>
+      </p:sp>
+      <p:sp>
+        <p:nvSpPr>
+          <p:cNvPr id="7" name="TextBox 6">
+            <a:extLst>
+              <a:ext uri="{FF2B5EF4-FFF2-40B4-BE49-F238E27FC236}">
+                <a16:creationId xmlns:a16="http://schemas.microsoft.com/office/drawing/2014/main" id="{282B114F-27EC-20BB-69BC-448F58910CA9}"/>
+              </a:ext>
+            </a:extLst>
+          </p:cNvPr>
+          <p:cNvSpPr txBox="1"/>
+          <p:nvPr/>
+        </p:nvSpPr>
+        <p:spPr>
+          <a:xfrm>
+            <a:off x="586448" y="4950117"/>
+            <a:ext cx="11019099" cy="830997"/>
+          </a:xfrm>
+          <a:prstGeom prst="rect">
+            <a:avLst/>
+          </a:prstGeom>
+          <a:noFill/>
+        </p:spPr>
+        <p:txBody>
+          <a:bodyPr wrap="square" rtlCol="0">
+            <a:spAutoFit/>
+          </a:bodyPr>
+          <a:lstStyle/>
+          <a:p>
+            <a:r>
+              <a:rPr lang="en-US" sz="2400" dirty="0">
+                <a:solidFill>
+                  <a:schemeClr val="bg1"/>
+                </a:solidFill>
+              </a:rPr>
+              <a:t>Prof. Shi co-authored work on “gRASPA”, a GPU-accelerated Monte Carlo software, is now published in the </a:t>
+            </a:r>
+            <a:r>
+              <a:rPr lang="en-US" sz="2400" i="1" dirty="0">
+                <a:solidFill>
+                  <a:schemeClr val="bg1"/>
+                </a:solidFill>
+              </a:rPr>
+              <a:t>Journal of Chemical Theory and Computation</a:t>
+            </a:r>
+            <a:r>
+              <a:rPr lang="en-US" sz="2400" dirty="0">
+                <a:solidFill>
+                  <a:schemeClr val="bg1"/>
+                </a:solidFill>
+              </a:rPr>
+              <a:t>. Check it out! </a:t>
+            </a:r>
+          </a:p>
+        </p:txBody>
+      </p:sp>
+    </p:spTree>
+    <p:extLst>
+      <p:ext uri="{BB962C8B-B14F-4D97-AF65-F5344CB8AC3E}">
+        <p14:creationId xmlns:p14="http://schemas.microsoft.com/office/powerpoint/2010/main" val="4010053269"/>
+      </p:ext>
+    </p:extLst>
+  </p:cSld>
+  <p:clrMapOvr>
+    <a:masterClrMapping/>
+  </p:clrMapOvr>
+</p:sld>
+</file>
+
+<file path=ppt/slides/slide4.xml><?xml version="1.0" encoding="utf-8"?>
 <p:sld xmlns:a="http://schemas.openxmlformats.org/drawingml/2006/main" xmlns:r="http://schemas.openxmlformats.org/officeDocument/2006/relationships" xmlns:p="http://schemas.openxmlformats.org/presentationml/2006/main">
   <p:cSld>
     <p:spTree>

</xml_diff>

<commit_message>
Deploying to gh-pages from @ ShiResearchGroup/shiresearchgroup.github.io@d71e4f610d847575a42967973a33c09b823b9e80 🚀
</commit_message>
<xml_diff>
--- a/assets/img/image_slider/images.pptx
+++ b/assets/img/image_slider/images.pptx
@@ -6,9 +6,10 @@
   </p:sldMasterIdLst>
   <p:sldIdLst>
     <p:sldId id="256" r:id="rId2"/>
-    <p:sldId id="258" r:id="rId3"/>
-    <p:sldId id="259" r:id="rId4"/>
-    <p:sldId id="257" r:id="rId5"/>
+    <p:sldId id="260" r:id="rId3"/>
+    <p:sldId id="258" r:id="rId4"/>
+    <p:sldId id="259" r:id="rId5"/>
+    <p:sldId id="257" r:id="rId6"/>
   </p:sldIdLst>
   <p:sldSz cx="12192000" cy="6858000"/>
   <p:notesSz cx="6858000" cy="9144000"/>
@@ -262,7 +263,7 @@
           <a:p>
             <a:fld id="{4A16C27B-D470-42F2-92F9-5356A7F22CB8}" type="datetimeFigureOut">
               <a:rPr lang="en-US" smtClean="0"/>
-              <a:t>11/19/2024</a:t>
+              <a:t>11/22/2025</a:t>
             </a:fld>
             <a:endParaRPr lang="en-US"/>
           </a:p>
@@ -460,7 +461,7 @@
           <a:p>
             <a:fld id="{4A16C27B-D470-42F2-92F9-5356A7F22CB8}" type="datetimeFigureOut">
               <a:rPr lang="en-US" smtClean="0"/>
-              <a:t>11/19/2024</a:t>
+              <a:t>11/22/2025</a:t>
             </a:fld>
             <a:endParaRPr lang="en-US"/>
           </a:p>
@@ -668,7 +669,7 @@
           <a:p>
             <a:fld id="{4A16C27B-D470-42F2-92F9-5356A7F22CB8}" type="datetimeFigureOut">
               <a:rPr lang="en-US" smtClean="0"/>
-              <a:t>11/19/2024</a:t>
+              <a:t>11/22/2025</a:t>
             </a:fld>
             <a:endParaRPr lang="en-US"/>
           </a:p>
@@ -866,7 +867,7 @@
           <a:p>
             <a:fld id="{4A16C27B-D470-42F2-92F9-5356A7F22CB8}" type="datetimeFigureOut">
               <a:rPr lang="en-US" smtClean="0"/>
-              <a:t>11/19/2024</a:t>
+              <a:t>11/22/2025</a:t>
             </a:fld>
             <a:endParaRPr lang="en-US"/>
           </a:p>
@@ -1141,7 +1142,7 @@
           <a:p>
             <a:fld id="{4A16C27B-D470-42F2-92F9-5356A7F22CB8}" type="datetimeFigureOut">
               <a:rPr lang="en-US" smtClean="0"/>
-              <a:t>11/19/2024</a:t>
+              <a:t>11/22/2025</a:t>
             </a:fld>
             <a:endParaRPr lang="en-US"/>
           </a:p>
@@ -1406,7 +1407,7 @@
           <a:p>
             <a:fld id="{4A16C27B-D470-42F2-92F9-5356A7F22CB8}" type="datetimeFigureOut">
               <a:rPr lang="en-US" smtClean="0"/>
-              <a:t>11/19/2024</a:t>
+              <a:t>11/22/2025</a:t>
             </a:fld>
             <a:endParaRPr lang="en-US"/>
           </a:p>
@@ -1818,7 +1819,7 @@
           <a:p>
             <a:fld id="{4A16C27B-D470-42F2-92F9-5356A7F22CB8}" type="datetimeFigureOut">
               <a:rPr lang="en-US" smtClean="0"/>
-              <a:t>11/19/2024</a:t>
+              <a:t>11/22/2025</a:t>
             </a:fld>
             <a:endParaRPr lang="en-US"/>
           </a:p>
@@ -1959,7 +1960,7 @@
           <a:p>
             <a:fld id="{4A16C27B-D470-42F2-92F9-5356A7F22CB8}" type="datetimeFigureOut">
               <a:rPr lang="en-US" smtClean="0"/>
-              <a:t>11/19/2024</a:t>
+              <a:t>11/22/2025</a:t>
             </a:fld>
             <a:endParaRPr lang="en-US"/>
           </a:p>
@@ -2072,7 +2073,7 @@
           <a:p>
             <a:fld id="{4A16C27B-D470-42F2-92F9-5356A7F22CB8}" type="datetimeFigureOut">
               <a:rPr lang="en-US" smtClean="0"/>
-              <a:t>11/19/2024</a:t>
+              <a:t>11/22/2025</a:t>
             </a:fld>
             <a:endParaRPr lang="en-US"/>
           </a:p>
@@ -2383,7 +2384,7 @@
           <a:p>
             <a:fld id="{4A16C27B-D470-42F2-92F9-5356A7F22CB8}" type="datetimeFigureOut">
               <a:rPr lang="en-US" smtClean="0"/>
-              <a:t>11/19/2024</a:t>
+              <a:t>11/22/2025</a:t>
             </a:fld>
             <a:endParaRPr lang="en-US"/>
           </a:p>
@@ -2671,7 +2672,7 @@
           <a:p>
             <a:fld id="{4A16C27B-D470-42F2-92F9-5356A7F22CB8}" type="datetimeFigureOut">
               <a:rPr lang="en-US" smtClean="0"/>
-              <a:t>11/19/2024</a:t>
+              <a:t>11/22/2025</a:t>
             </a:fld>
             <a:endParaRPr lang="en-US"/>
           </a:p>
@@ -2912,7 +2913,7 @@
           <a:p>
             <a:fld id="{4A16C27B-D470-42F2-92F9-5356A7F22CB8}" type="datetimeFigureOut">
               <a:rPr lang="en-US" smtClean="0"/>
-              <a:t>11/19/2024</a:t>
+              <a:t>11/22/2025</a:t>
             </a:fld>
             <a:endParaRPr lang="en-US"/>
           </a:p>
@@ -3479,6 +3480,172 @@
         <p:cNvPr id="1" name="">
           <a:extLst>
             <a:ext uri="{FF2B5EF4-FFF2-40B4-BE49-F238E27FC236}">
+              <a16:creationId xmlns:a16="http://schemas.microsoft.com/office/drawing/2014/main" id="{E408D522-B3CB-DA8F-CB70-B89F5472FCF2}"/>
+            </a:ext>
+          </a:extLst>
+        </p:cNvPr>
+        <p:cNvGrpSpPr/>
+        <p:nvPr/>
+      </p:nvGrpSpPr>
+      <p:grpSpPr>
+        <a:xfrm>
+          <a:off x="0" y="0"/>
+          <a:ext cx="0" cy="0"/>
+          <a:chOff x="0" y="0"/>
+          <a:chExt cx="0" cy="0"/>
+        </a:xfrm>
+      </p:grpSpPr>
+      <p:pic>
+        <p:nvPicPr>
+          <p:cNvPr id="3" name="Picture 2" descr="A group of people standing in front of a white board&#10;&#10;AI-generated content may be incorrect.">
+            <a:extLst>
+              <a:ext uri="{FF2B5EF4-FFF2-40B4-BE49-F238E27FC236}">
+                <a16:creationId xmlns:a16="http://schemas.microsoft.com/office/drawing/2014/main" id="{C19D5E7E-0151-6A1E-B924-43AB56D69D82}"/>
+              </a:ext>
+            </a:extLst>
+          </p:cNvPr>
+          <p:cNvPicPr>
+            <a:picLocks noChangeAspect="1"/>
+          </p:cNvPicPr>
+          <p:nvPr/>
+        </p:nvPicPr>
+        <p:blipFill>
+          <a:blip r:embed="rId2">
+            <a:extLst>
+              <a:ext uri="{28A0092B-C50C-407E-A947-70E740481C1C}">
+                <a14:useLocalDpi xmlns:a14="http://schemas.microsoft.com/office/drawing/2010/main" val="0"/>
+              </a:ext>
+            </a:extLst>
+          </a:blip>
+          <a:srcRect l="12227" t="15731" r="12879" b="28093"/>
+          <a:stretch>
+            <a:fillRect/>
+          </a:stretch>
+        </p:blipFill>
+        <p:spPr>
+          <a:xfrm>
+            <a:off x="0" y="0"/>
+            <a:ext cx="12192000" cy="6098272"/>
+          </a:xfrm>
+          <a:prstGeom prst="rect">
+            <a:avLst/>
+          </a:prstGeom>
+        </p:spPr>
+      </p:pic>
+      <p:sp>
+        <p:nvSpPr>
+          <p:cNvPr id="6" name="Rectangle 5">
+            <a:extLst>
+              <a:ext uri="{FF2B5EF4-FFF2-40B4-BE49-F238E27FC236}">
+                <a16:creationId xmlns:a16="http://schemas.microsoft.com/office/drawing/2014/main" id="{1CD517C7-8524-A904-DF83-7B61B6E93409}"/>
+              </a:ext>
+            </a:extLst>
+          </p:cNvPr>
+          <p:cNvSpPr/>
+          <p:nvPr/>
+        </p:nvSpPr>
+        <p:spPr>
+          <a:xfrm>
+            <a:off x="0" y="4632960"/>
+            <a:ext cx="12191999" cy="1465312"/>
+          </a:xfrm>
+          <a:prstGeom prst="rect">
+            <a:avLst/>
+          </a:prstGeom>
+          <a:solidFill>
+            <a:srgbClr val="000000">
+              <a:alpha val="60000"/>
+            </a:srgbClr>
+          </a:solidFill>
+          <a:ln>
+            <a:noFill/>
+          </a:ln>
+        </p:spPr>
+        <p:style>
+          <a:lnRef idx="2">
+            <a:schemeClr val="accent1">
+              <a:shade val="15000"/>
+            </a:schemeClr>
+          </a:lnRef>
+          <a:fillRef idx="1">
+            <a:schemeClr val="accent1"/>
+          </a:fillRef>
+          <a:effectRef idx="0">
+            <a:schemeClr val="accent1"/>
+          </a:effectRef>
+          <a:fontRef idx="minor">
+            <a:schemeClr val="lt1"/>
+          </a:fontRef>
+        </p:style>
+        <p:txBody>
+          <a:bodyPr rtlCol="0" anchor="ctr"/>
+          <a:lstStyle/>
+          <a:p>
+            <a:pPr marL="457200"/>
+            <a:endParaRPr lang="en-US" sz="2400" dirty="0"/>
+          </a:p>
+        </p:txBody>
+      </p:sp>
+      <p:sp>
+        <p:nvSpPr>
+          <p:cNvPr id="7" name="TextBox 6">
+            <a:extLst>
+              <a:ext uri="{FF2B5EF4-FFF2-40B4-BE49-F238E27FC236}">
+                <a16:creationId xmlns:a16="http://schemas.microsoft.com/office/drawing/2014/main" id="{2C5ED514-0F8B-E6CE-3448-B3A36C276F7A}"/>
+              </a:ext>
+            </a:extLst>
+          </p:cNvPr>
+          <p:cNvSpPr txBox="1"/>
+          <p:nvPr/>
+        </p:nvSpPr>
+        <p:spPr>
+          <a:xfrm>
+            <a:off x="586449" y="5134783"/>
+            <a:ext cx="11019099" cy="461665"/>
+          </a:xfrm>
+          <a:prstGeom prst="rect">
+            <a:avLst/>
+          </a:prstGeom>
+          <a:noFill/>
+        </p:spPr>
+        <p:txBody>
+          <a:bodyPr wrap="square" rtlCol="0">
+            <a:spAutoFit/>
+          </a:bodyPr>
+          <a:lstStyle/>
+          <a:p>
+            <a:r>
+              <a:rPr lang="en-US" sz="2400" dirty="0">
+                <a:solidFill>
+                  <a:schemeClr val="bg1"/>
+                </a:solidFill>
+              </a:rPr>
+              <a:t>Shi group at the 2025 Annual CBE Graduate Student Research Symposium</a:t>
+            </a:r>
+          </a:p>
+        </p:txBody>
+      </p:sp>
+    </p:spTree>
+    <p:extLst>
+      <p:ext uri="{BB962C8B-B14F-4D97-AF65-F5344CB8AC3E}">
+        <p14:creationId xmlns:p14="http://schemas.microsoft.com/office/powerpoint/2010/main" val="487744838"/>
+      </p:ext>
+    </p:extLst>
+  </p:cSld>
+  <p:clrMapOvr>
+    <a:masterClrMapping/>
+  </p:clrMapOvr>
+</p:sld>
+</file>
+
+<file path=ppt/slides/slide3.xml><?xml version="1.0" encoding="utf-8"?>
+<p:sld xmlns:a="http://schemas.openxmlformats.org/drawingml/2006/main" xmlns:r="http://schemas.openxmlformats.org/officeDocument/2006/relationships" xmlns:p="http://schemas.openxmlformats.org/presentationml/2006/main">
+  <p:cSld>
+    <p:spTree>
+      <p:nvGrpSpPr>
+        <p:cNvPr id="1" name="">
+          <a:extLst>
+            <a:ext uri="{FF2B5EF4-FFF2-40B4-BE49-F238E27FC236}">
               <a16:creationId xmlns:a16="http://schemas.microsoft.com/office/drawing/2014/main" id="{64A8C2D0-7C4B-1642-3AC9-3C90C1F01262}"/>
             </a:ext>
           </a:extLst>
@@ -3641,7 +3808,7 @@
 </p:sld>
 </file>
 
-<file path=ppt/slides/slide3.xml><?xml version="1.0" encoding="utf-8"?>
+<file path=ppt/slides/slide4.xml><?xml version="1.0" encoding="utf-8"?>
 <p:sld xmlns:a="http://schemas.openxmlformats.org/drawingml/2006/main" xmlns:r="http://schemas.openxmlformats.org/officeDocument/2006/relationships" xmlns:p="http://schemas.openxmlformats.org/presentationml/2006/main">
   <p:cSld>
     <p:spTree>
@@ -3873,7 +4040,7 @@
 </p:sld>
 </file>
 
-<file path=ppt/slides/slide4.xml><?xml version="1.0" encoding="utf-8"?>
+<file path=ppt/slides/slide5.xml><?xml version="1.0" encoding="utf-8"?>
 <p:sld xmlns:a="http://schemas.openxmlformats.org/drawingml/2006/main" xmlns:r="http://schemas.openxmlformats.org/officeDocument/2006/relationships" xmlns:p="http://schemas.openxmlformats.org/presentationml/2006/main">
   <p:cSld>
     <p:spTree>

</xml_diff>